<commit_message>
Updates for Pittsburgh Training
</commit_message>
<xml_diff>
--- a/slides/Corepac Performance.pptx
+++ b/slides/Corepac Performance.pptx
@@ -278,7 +278,7 @@
               <a:pPr>
                 <a:defRPr/>
               </a:pPr>
-              <a:t>1/17/2012</a:t>
+              <a:t>2/28/2012</a:t>
             </a:fld>
             <a:endParaRPr lang="en-US" dirty="0"/>
           </a:p>
@@ -2213,7 +2213,15 @@
                 <a:spcPct val="0"/>
               </a:spcBef>
             </a:pPr>
-            <a:endParaRPr lang="en-US" smtClean="0"/>
+            <a:r>
+              <a:rPr lang="en-US" dirty="0" smtClean="0"/>
+              <a:t>Should the</a:t>
+            </a:r>
+            <a:r>
+              <a:rPr lang="en-US" baseline="0" dirty="0" smtClean="0"/>
+              <a:t> EXECUTEs be sequential here?  E1, E2. E3, etc.</a:t>
+            </a:r>
+            <a:endParaRPr lang="en-US" dirty="0" smtClean="0"/>
           </a:p>
         </p:txBody>
       </p:sp>
@@ -2581,7 +2589,11 @@
           </a:bodyPr>
           <a:lstStyle/>
           <a:p>
-            <a:endParaRPr lang="en-US"/>
+            <a:r>
+              <a:rPr lang="en-US" dirty="0" smtClean="0"/>
+              <a:t>Indicate here how many cycles this code processing will require (15 cycles)</a:t>
+            </a:r>
+            <a:endParaRPr lang="en-US" dirty="0"/>
           </a:p>
         </p:txBody>
       </p:sp>
@@ -3867,35 +3879,35 @@
           <a:p>
             <a:pPr lvl="0"/>
             <a:r>
-              <a:rPr lang="en-US" smtClean="0"/>
+              <a:rPr lang="en-US" dirty="0" smtClean="0"/>
               <a:t>Click to edit Master text styles</a:t>
             </a:r>
           </a:p>
           <a:p>
             <a:pPr lvl="1"/>
             <a:r>
-              <a:rPr lang="en-US" smtClean="0"/>
+              <a:rPr lang="en-US" dirty="0" smtClean="0"/>
               <a:t>Second level</a:t>
             </a:r>
           </a:p>
           <a:p>
             <a:pPr lvl="2"/>
             <a:r>
-              <a:rPr lang="en-US" smtClean="0"/>
+              <a:rPr lang="en-US" dirty="0" smtClean="0"/>
               <a:t>Third level</a:t>
             </a:r>
           </a:p>
           <a:p>
             <a:pPr lvl="3"/>
             <a:r>
-              <a:rPr lang="en-US" smtClean="0"/>
+              <a:rPr lang="en-US" dirty="0" smtClean="0"/>
               <a:t>Fourth level</a:t>
             </a:r>
           </a:p>
           <a:p>
             <a:pPr lvl="4"/>
             <a:r>
-              <a:rPr lang="en-US" smtClean="0"/>
+              <a:rPr lang="en-US" dirty="0" smtClean="0"/>
               <a:t>Fifth level</a:t>
             </a:r>
           </a:p>
@@ -3989,7 +4001,7 @@
       </p:pic>
       <p:sp>
         <p:nvSpPr>
-          <p:cNvPr id="10" name="Rectangle 9"/>
+          <p:cNvPr id="7" name="Rectangle 6"/>
           <p:cNvSpPr/>
           <p:nvPr userDrawn="1">
             <p:custDataLst>
@@ -3999,8 +4011,8 @@
         </p:nvSpPr>
         <p:spPr>
           <a:xfrm>
-            <a:off x="7930120" y="6498264"/>
-            <a:ext cx="856260" cy="276999"/>
+            <a:off x="7405897" y="6520036"/>
+            <a:ext cx="1357103" cy="240066"/>
           </a:xfrm>
           <a:prstGeom prst="rect">
             <a:avLst/>
@@ -4025,6 +4037,26 @@
               <a:defRPr/>
             </a:pPr>
             <a:r>
+              <a:rPr lang="en-US" sz="1200" b="1" dirty="0" smtClean="0">
+                <a:ln w="10541" cmpd="sng">
+                  <a:solidFill>
+                    <a:srgbClr val="7D7D7D">
+                      <a:tint val="100000"/>
+                      <a:shade val="100000"/>
+                      <a:satMod val="110000"/>
+                    </a:srgbClr>
+                  </a:solidFill>
+                  <a:prstDash val="solid"/>
+                </a:ln>
+                <a:solidFill>
+                  <a:srgbClr val="000000"/>
+                </a:solidFill>
+                <a:latin typeface="Calibri"/>
+                <a:cs typeface="Arial" charset="0"/>
+              </a:rPr>
+              <a:t>Multicore </a:t>
+            </a:r>
+            <a:r>
               <a:rPr lang="en-US" sz="1200" b="1" dirty="0">
                 <a:ln w="10541" cmpd="sng">
                   <a:solidFill>
@@ -4042,7 +4074,7 @@
                 <a:latin typeface="Calibri"/>
                 <a:cs typeface="Arial" charset="0"/>
               </a:rPr>
-              <a:t>CI Training</a:t>
+              <a:t>Training</a:t>
             </a:r>
           </a:p>
         </p:txBody>
@@ -5666,7 +5698,7 @@
               <a:rPr lang="en-US" sz="2000" dirty="0" smtClean="0">
                 <a:latin typeface="+mj-lt"/>
               </a:rPr>
-              <a:t>Efficient instruction scheduling maximizes functional unit throughput.</a:t>
+              <a:t>Software pipeline enables efficient instruction scheduling to maximize functional unit throughput.</a:t>
             </a:r>
           </a:p>
           <a:p>
@@ -6484,13 +6516,13 @@
                 <a:defRPr/>
               </a:pPr>
               <a:r>
-                <a:rPr lang="en-US" sz="2000" dirty="0" err="1">
+                <a:rPr lang="en-US" sz="2000" dirty="0">
                   <a:latin typeface="+mj-lt"/>
                 </a:rPr>
                 <a:t>R</a:t>
               </a:r>
               <a:r>
-                <a:rPr lang="en-US" sz="2000" dirty="0" err="1" smtClean="0">
+                <a:rPr lang="en-US" sz="2000" dirty="0" smtClean="0">
                   <a:latin typeface="+mj-lt"/>
                 </a:rPr>
                 <a:t>egs</a:t>
@@ -6567,13 +6599,13 @@
                 <a:defRPr/>
               </a:pPr>
               <a:r>
-                <a:rPr lang="en-US" sz="2000" dirty="0" err="1">
+                <a:rPr lang="en-US" sz="2000" dirty="0">
                   <a:latin typeface="+mj-lt"/>
                 </a:rPr>
                 <a:t>R</a:t>
               </a:r>
               <a:r>
-                <a:rPr lang="en-US" sz="2000" dirty="0" err="1" smtClean="0">
+                <a:rPr lang="en-US" sz="2000" dirty="0" smtClean="0">
                   <a:latin typeface="+mj-lt"/>
                 </a:rPr>
                 <a:t>egs</a:t>
@@ -17734,50 +17766,50 @@
           <a:lstStyle/>
           <a:p>
             <a:r>
-              <a:rPr lang="en-US" sz="2800">
+              <a:rPr lang="en-US" sz="2800" dirty="0" smtClean="0">
                 <a:latin typeface="Calibri" pitchFamily="34" charset="0"/>
               </a:rPr>
               <a:t>How many cycles would</a:t>
             </a:r>
             <a:br>
-              <a:rPr lang="en-US" sz="2800">
+              <a:rPr lang="en-US" sz="2800" dirty="0" smtClean="0">
                 <a:latin typeface="Calibri" pitchFamily="34" charset="0"/>
               </a:rPr>
             </a:br>
             <a:r>
-              <a:rPr lang="en-US" sz="2800">
+              <a:rPr lang="en-US" sz="2800" dirty="0" smtClean="0">
                 <a:latin typeface="Calibri" pitchFamily="34" charset="0"/>
               </a:rPr>
               <a:t>it take to perform this</a:t>
             </a:r>
             <a:br>
-              <a:rPr lang="en-US" sz="2800">
+              <a:rPr lang="en-US" sz="2800" dirty="0" smtClean="0">
                 <a:latin typeface="Calibri" pitchFamily="34" charset="0"/>
               </a:rPr>
             </a:br>
             <a:r>
-              <a:rPr lang="en-US" sz="2800">
+              <a:rPr lang="en-US" sz="2800" dirty="0" smtClean="0">
                 <a:latin typeface="Calibri" pitchFamily="34" charset="0"/>
               </a:rPr>
-              <a:t>loop 5 times?</a:t>
+              <a:t>loop five times?</a:t>
             </a:r>
           </a:p>
           <a:p>
             <a:r>
-              <a:rPr lang="en-US" sz="2800">
+              <a:rPr lang="en-US" sz="2800" dirty="0" smtClean="0">
                 <a:latin typeface="Calibri" pitchFamily="34" charset="0"/>
               </a:rPr>
-              <a:t>(Disregard delay-slots).</a:t>
+              <a:t>(Disregard delay slots).</a:t>
             </a:r>
           </a:p>
           <a:p>
-            <a:endParaRPr lang="en-US" sz="2800">
+            <a:endParaRPr lang="en-US" sz="2800" dirty="0">
               <a:latin typeface="Calibri" pitchFamily="34" charset="0"/>
             </a:endParaRPr>
           </a:p>
           <a:p>
             <a:r>
-              <a:rPr lang="en-US" sz="2800">
+              <a:rPr lang="en-US" sz="2800" dirty="0">
                 <a:latin typeface="Calibri" pitchFamily="34" charset="0"/>
               </a:rPr>
               <a:t>     5 x 3 = 15 cycles</a:t>
@@ -17815,13 +17847,14 @@
               <a:defRPr/>
             </a:pPr>
             <a:r>
-              <a:rPr lang="en-US" sz="2400" dirty="0">
+              <a:rPr lang="en-US" sz="2400" dirty="0" smtClean="0">
                 <a:latin typeface="+mj-lt"/>
-                <a:ea typeface="+mj-ea"/>
-                <a:cs typeface="+mj-cs"/>
               </a:rPr>
-              <a:t>A typical DSP MAC operation- dot product</a:t>
+              <a:t>Dot product; A typical DSP MAC operation.</a:t>
             </a:r>
+            <a:endParaRPr lang="en-US" sz="2400" dirty="0">
+              <a:latin typeface="+mj-lt"/>
+            </a:endParaRPr>
           </a:p>
         </p:txBody>
       </p:sp>

</xml_diff>